<commit_message>
Udated the final docs
</commit_message>
<xml_diff>
--- a/docs/NLP_Prep_Process.pptx
+++ b/docs/NLP_Prep_Process.pptx
@@ -104,19 +104,48 @@
       </a:defRPr>
     </a:lvl9pPr>
   </p:defaultTextStyle>
+  <p:extLst>
+    <p:ext uri="{EFAFB233-063F-42B5-8137-9DF3F51BA10A}">
+      <p15:sldGuideLst xmlns:p15="http://schemas.microsoft.com/office/powerpoint/2012/main"/>
+    </p:ext>
+  </p:extLst>
 </p:presentation>
 </file>
 
 <file path=ppt/revisionInfo.xml><?xml version="1.0" encoding="utf-8"?>
 <p1510:revInfo xmlns:a="http://schemas.openxmlformats.org/drawingml/2006/main" xmlns:r="http://schemas.openxmlformats.org/officeDocument/2006/relationships" xmlns:p1510="http://schemas.microsoft.com/office/powerpoint/2015/10/main">
   <p1510:revLst>
-    <p1510:client id="{087ADBAD-24C2-498F-BDA9-090C283023D4}" v="7" dt="2019-11-27T20:08:14.550"/>
+    <p1510:client id="{B7CA3DE5-D32C-43A2-B516-5FB01A28315B}" v="482" dt="2019-11-30T21:42:53.898"/>
   </p1510:revLst>
 </p1510:revInfo>
 </file>
 
 <file path=ppt/changesInfos/changesInfo1.xml><?xml version="1.0" encoding="utf-8"?>
 <pc:chgInfo xmlns:a="http://schemas.openxmlformats.org/drawingml/2006/main" xmlns:r="http://schemas.openxmlformats.org/officeDocument/2006/relationships" xmlns:ac="http://schemas.microsoft.com/office/drawing/2013/main/command" xmlns:pc="http://schemas.microsoft.com/office/powerpoint/2013/main/command">
+  <pc:docChgLst>
+    <pc:chgData name="Drikus Dreyer" userId="2b911c4b7b469c0c" providerId="LiveId" clId="{B7CA3DE5-D32C-43A2-B516-5FB01A28315B}"/>
+    <pc:docChg chg="modSld">
+      <pc:chgData name="Drikus Dreyer" userId="2b911c4b7b469c0c" providerId="LiveId" clId="{B7CA3DE5-D32C-43A2-B516-5FB01A28315B}" dt="2019-11-30T21:42:53.898" v="481" actId="20577"/>
+      <pc:docMkLst>
+        <pc:docMk/>
+      </pc:docMkLst>
+      <pc:sldChg chg="modSp">
+        <pc:chgData name="Drikus Dreyer" userId="2b911c4b7b469c0c" providerId="LiveId" clId="{B7CA3DE5-D32C-43A2-B516-5FB01A28315B}" dt="2019-11-30T21:42:53.898" v="481" actId="20577"/>
+        <pc:sldMkLst>
+          <pc:docMk/>
+          <pc:sldMk cId="28410257" sldId="256"/>
+        </pc:sldMkLst>
+        <pc:graphicFrameChg chg="mod">
+          <ac:chgData name="Drikus Dreyer" userId="2b911c4b7b469c0c" providerId="LiveId" clId="{B7CA3DE5-D32C-43A2-B516-5FB01A28315B}" dt="2019-11-30T21:42:53.898" v="481" actId="20577"/>
+          <ac:graphicFrameMkLst>
+            <pc:docMk/>
+            <pc:sldMk cId="28410257" sldId="256"/>
+            <ac:graphicFrameMk id="7" creationId="{BC8BF6EA-4BC1-495F-9268-E2544B0764D7}"/>
+          </ac:graphicFrameMkLst>
+        </pc:graphicFrameChg>
+      </pc:sldChg>
+    </pc:docChg>
+  </pc:docChgLst>
   <pc:docChgLst>
     <pc:chgData name="Drikus Dreyer" userId="2b911c4b7b469c0c" providerId="LiveId" clId="{087ADBAD-24C2-498F-BDA9-090C283023D4}"/>
     <pc:docChg chg="modSld">
@@ -914,7 +943,7 @@
         <a:p>
           <a:r>
             <a:rPr lang="en-AU" sz="1200" dirty="0"/>
-            <a:t>LOAD</a:t>
+            <a:t>Load</a:t>
           </a:r>
         </a:p>
       </dgm:t>
@@ -986,7 +1015,13 @@
         <a:p>
           <a:r>
             <a:rPr lang="en-AU" sz="1200" dirty="0"/>
-            <a:t>LOWER</a:t>
+            <a:t>Create</a:t>
+          </a:r>
+        </a:p>
+        <a:p>
+          <a:r>
+            <a:rPr lang="en-AU" sz="1200" dirty="0"/>
+            <a:t>RDD</a:t>
           </a:r>
         </a:p>
       </dgm:t>
@@ -1022,7 +1057,7 @@
         <a:p>
           <a:r>
             <a:rPr lang="en-AU" sz="1200" dirty="0"/>
-            <a:t>Convert Corpus content to lowercase</a:t>
+            <a:t>Define and create the RDD</a:t>
           </a:r>
         </a:p>
       </dgm:t>
@@ -1058,7 +1093,7 @@
         <a:p>
           <a:r>
             <a:rPr lang="en-AU" sz="1200" dirty="0"/>
-            <a:t>FILTER</a:t>
+            <a:t>Flatten</a:t>
           </a:r>
         </a:p>
       </dgm:t>
@@ -1094,7 +1129,7 @@
         <a:p>
           <a:r>
             <a:rPr lang="en-AU" sz="1200" dirty="0"/>
-            <a:t>Remove Null entries and empty values</a:t>
+            <a:t>Transform data frame into a flat structure</a:t>
           </a:r>
         </a:p>
       </dgm:t>
@@ -1130,7 +1165,7 @@
         <a:p>
           <a:r>
             <a:rPr lang="en-AU" sz="1200" dirty="0"/>
-            <a:t>SENTENCE TOKENIZE</a:t>
+            <a:t>Remove Header</a:t>
           </a:r>
         </a:p>
       </dgm:t>
@@ -1166,7 +1201,7 @@
         <a:p>
           <a:r>
             <a:rPr lang="en-AU" sz="1200" dirty="0"/>
-            <a:t>Tokenize each sentence in the corpus</a:t>
+            <a:t>Get rid of the header row</a:t>
           </a:r>
         </a:p>
       </dgm:t>
@@ -1202,7 +1237,7 @@
         <a:p>
           <a:r>
             <a:rPr lang="en-AU" sz="1200" dirty="0"/>
-            <a:t>WORDS TOKENIZE</a:t>
+            <a:t>Sentence Tokenize</a:t>
           </a:r>
         </a:p>
       </dgm:t>
@@ -1238,7 +1273,7 @@
         <a:p>
           <a:r>
             <a:rPr lang="en-AU" sz="1200" dirty="0"/>
-            <a:t>Tokenize each word in each sentence</a:t>
+            <a:t>Tokenize each sentence</a:t>
           </a:r>
         </a:p>
       </dgm:t>
@@ -1274,7 +1309,7 @@
         <a:p>
           <a:r>
             <a:rPr lang="en-AU" sz="1200" dirty="0"/>
-            <a:t>PUNCTUATION</a:t>
+            <a:t>HTML Parsing</a:t>
           </a:r>
         </a:p>
       </dgm:t>
@@ -1310,7 +1345,7 @@
         <a:p>
           <a:r>
             <a:rPr lang="en-AU" sz="1200" dirty="0"/>
-            <a:t>Remove all punctuation from corpus</a:t>
+            <a:t>Remove all HTML formats (intended for comments)</a:t>
           </a:r>
         </a:p>
       </dgm:t>
@@ -1346,7 +1381,7 @@
         <a:p>
           <a:r>
             <a:rPr lang="en-AU" sz="1200" dirty="0"/>
-            <a:t>LAMMETIZATION</a:t>
+            <a:t>VADER</a:t>
           </a:r>
         </a:p>
       </dgm:t>
@@ -1382,7 +1417,7 @@
         <a:p>
           <a:r>
             <a:rPr lang="en-GB" sz="1200" b="0" i="0" dirty="0"/>
-            <a:t>Group together the inflected forms of the corpus words so they can be analysed as a single item</a:t>
+            <a:t>Apply VADER sentiment analysis to each comment/headline</a:t>
           </a:r>
           <a:endParaRPr lang="en-AU" sz="1200" dirty="0"/>
         </a:p>
@@ -1419,7 +1454,7 @@
         <a:p>
           <a:r>
             <a:rPr lang="en-AU" sz="1200" dirty="0"/>
-            <a:t>RE-JOIN</a:t>
+            <a:t>Transform to Pandas Data Frame</a:t>
           </a:r>
         </a:p>
       </dgm:t>
@@ -1455,8 +1490,13 @@
         <a:p>
           <a:r>
             <a:rPr lang="en-AU" sz="1200" dirty="0"/>
-            <a:t>Re-join the tokenized words back into sentences. </a:t>
+            <a:t>Convert Spark data frame to Pandas </a:t>
           </a:r>
+          <a:r>
+            <a:rPr lang="en-AU" sz="1200"/>
+            <a:t>data frame</a:t>
+          </a:r>
+          <a:endParaRPr lang="en-AU" sz="1200" dirty="0"/>
         </a:p>
       </dgm:t>
     </dgm:pt>
@@ -1957,7 +1997,7 @@
           </a:pPr>
           <a:r>
             <a:rPr lang="en-AU" sz="1200" kern="1200" dirty="0"/>
-            <a:t>LOAD</a:t>
+            <a:t>Load</a:t>
           </a:r>
         </a:p>
       </dsp:txBody>
@@ -2150,7 +2190,25 @@
           </a:pPr>
           <a:r>
             <a:rPr lang="en-AU" sz="1200" kern="1200" dirty="0"/>
-            <a:t>LOWER</a:t>
+            <a:t>Create</a:t>
+          </a:r>
+        </a:p>
+        <a:p>
+          <a:pPr marL="0" lvl="0" indent="0" algn="ctr" defTabSz="533400">
+            <a:lnSpc>
+              <a:spcPct val="90000"/>
+            </a:lnSpc>
+            <a:spcBef>
+              <a:spcPct val="0"/>
+            </a:spcBef>
+            <a:spcAft>
+              <a:spcPct val="35000"/>
+            </a:spcAft>
+            <a:buNone/>
+          </a:pPr>
+          <a:r>
+            <a:rPr lang="en-AU" sz="1200" kern="1200" dirty="0"/>
+            <a:t>RDD</a:t>
           </a:r>
         </a:p>
       </dsp:txBody>
@@ -2210,7 +2268,7 @@
           </a:pPr>
           <a:r>
             <a:rPr lang="en-AU" sz="1200" kern="1200" dirty="0"/>
-            <a:t>Convert Corpus content to lowercase</a:t>
+            <a:t>Define and create the RDD</a:t>
           </a:r>
         </a:p>
       </dsp:txBody>
@@ -2343,7 +2401,7 @@
           </a:pPr>
           <a:r>
             <a:rPr lang="en-AU" sz="1200" kern="1200" dirty="0"/>
-            <a:t>FILTER</a:t>
+            <a:t>Flatten</a:t>
           </a:r>
         </a:p>
       </dsp:txBody>
@@ -2403,7 +2461,7 @@
           </a:pPr>
           <a:r>
             <a:rPr lang="en-AU" sz="1200" kern="1200" dirty="0"/>
-            <a:t>Remove Null entries and empty values</a:t>
+            <a:t>Transform data frame into a flat structure</a:t>
           </a:r>
         </a:p>
       </dsp:txBody>
@@ -2536,7 +2594,7 @@
           </a:pPr>
           <a:r>
             <a:rPr lang="en-AU" sz="1200" kern="1200" dirty="0"/>
-            <a:t>SENTENCE TOKENIZE</a:t>
+            <a:t>Remove Header</a:t>
           </a:r>
         </a:p>
       </dsp:txBody>
@@ -2596,7 +2654,7 @@
           </a:pPr>
           <a:r>
             <a:rPr lang="en-AU" sz="1200" kern="1200" dirty="0"/>
-            <a:t>Tokenize each sentence in the corpus</a:t>
+            <a:t>Get rid of the header row</a:t>
           </a:r>
         </a:p>
       </dsp:txBody>
@@ -2729,7 +2787,7 @@
           </a:pPr>
           <a:r>
             <a:rPr lang="en-AU" sz="1200" kern="1200" dirty="0"/>
-            <a:t>WORDS TOKENIZE</a:t>
+            <a:t>Sentence Tokenize</a:t>
           </a:r>
         </a:p>
       </dsp:txBody>
@@ -2789,7 +2847,7 @@
           </a:pPr>
           <a:r>
             <a:rPr lang="en-AU" sz="1200" kern="1200" dirty="0"/>
-            <a:t>Tokenize each word in each sentence</a:t>
+            <a:t>Tokenize each sentence</a:t>
           </a:r>
         </a:p>
       </dsp:txBody>
@@ -2922,7 +2980,7 @@
           </a:pPr>
           <a:r>
             <a:rPr lang="en-AU" sz="1200" kern="1200" dirty="0"/>
-            <a:t>PUNCTUATION</a:t>
+            <a:t>HTML Parsing</a:t>
           </a:r>
         </a:p>
       </dsp:txBody>
@@ -2982,7 +3040,7 @@
           </a:pPr>
           <a:r>
             <a:rPr lang="en-AU" sz="1200" kern="1200" dirty="0"/>
-            <a:t>Remove all punctuation from corpus</a:t>
+            <a:t>Remove all HTML formats (intended for comments)</a:t>
           </a:r>
         </a:p>
       </dsp:txBody>
@@ -3115,7 +3173,7 @@
           </a:pPr>
           <a:r>
             <a:rPr lang="en-AU" sz="1200" kern="1200" dirty="0"/>
-            <a:t>LAMMETIZATION</a:t>
+            <a:t>VADER</a:t>
           </a:r>
         </a:p>
       </dsp:txBody>
@@ -3175,7 +3233,7 @@
           </a:pPr>
           <a:r>
             <a:rPr lang="en-GB" sz="1200" b="0" i="0" kern="1200" dirty="0"/>
-            <a:t>Group together the inflected forms of the corpus words so they can be analysed as a single item</a:t>
+            <a:t>Apply VADER sentiment analysis to each comment/headline</a:t>
           </a:r>
           <a:endParaRPr lang="en-AU" sz="1200" kern="1200" dirty="0"/>
         </a:p>
@@ -3256,7 +3314,7 @@
           </a:pPr>
           <a:r>
             <a:rPr lang="en-AU" sz="1200" kern="1200" dirty="0"/>
-            <a:t>RE-JOIN</a:t>
+            <a:t>Transform to Pandas Data Frame</a:t>
           </a:r>
         </a:p>
       </dsp:txBody>
@@ -3316,8 +3374,13 @@
           </a:pPr>
           <a:r>
             <a:rPr lang="en-AU" sz="1200" kern="1200" dirty="0"/>
-            <a:t>Re-join the tokenized words back into sentences. </a:t>
+            <a:t>Convert Spark data frame to Pandas </a:t>
           </a:r>
+          <a:r>
+            <a:rPr lang="en-AU" sz="1200" kern="1200"/>
+            <a:t>data frame</a:t>
+          </a:r>
+          <a:endParaRPr lang="en-AU" sz="1200" kern="1200" dirty="0"/>
         </a:p>
       </dsp:txBody>
       <dsp:txXfrm>
@@ -4830,7 +4893,7 @@
           <a:p>
             <a:fld id="{9B9F853A-9183-4EE6-852D-47D503602EAA}" type="datetimeFigureOut">
               <a:rPr lang="en-AU" smtClean="0"/>
-              <a:t>28/11/2019</a:t>
+              <a:t>1/12/2019</a:t>
             </a:fld>
             <a:endParaRPr lang="en-AU"/>
           </a:p>
@@ -5030,7 +5093,7 @@
           <a:p>
             <a:fld id="{9B9F853A-9183-4EE6-852D-47D503602EAA}" type="datetimeFigureOut">
               <a:rPr lang="en-AU" smtClean="0"/>
-              <a:t>28/11/2019</a:t>
+              <a:t>1/12/2019</a:t>
             </a:fld>
             <a:endParaRPr lang="en-AU"/>
           </a:p>
@@ -5240,7 +5303,7 @@
           <a:p>
             <a:fld id="{9B9F853A-9183-4EE6-852D-47D503602EAA}" type="datetimeFigureOut">
               <a:rPr lang="en-AU" smtClean="0"/>
-              <a:t>28/11/2019</a:t>
+              <a:t>1/12/2019</a:t>
             </a:fld>
             <a:endParaRPr lang="en-AU"/>
           </a:p>
@@ -5440,7 +5503,7 @@
           <a:p>
             <a:fld id="{9B9F853A-9183-4EE6-852D-47D503602EAA}" type="datetimeFigureOut">
               <a:rPr lang="en-AU" smtClean="0"/>
-              <a:t>28/11/2019</a:t>
+              <a:t>1/12/2019</a:t>
             </a:fld>
             <a:endParaRPr lang="en-AU"/>
           </a:p>
@@ -5716,7 +5779,7 @@
           <a:p>
             <a:fld id="{9B9F853A-9183-4EE6-852D-47D503602EAA}" type="datetimeFigureOut">
               <a:rPr lang="en-AU" smtClean="0"/>
-              <a:t>28/11/2019</a:t>
+              <a:t>1/12/2019</a:t>
             </a:fld>
             <a:endParaRPr lang="en-AU"/>
           </a:p>
@@ -5984,7 +6047,7 @@
           <a:p>
             <a:fld id="{9B9F853A-9183-4EE6-852D-47D503602EAA}" type="datetimeFigureOut">
               <a:rPr lang="en-AU" smtClean="0"/>
-              <a:t>28/11/2019</a:t>
+              <a:t>1/12/2019</a:t>
             </a:fld>
             <a:endParaRPr lang="en-AU"/>
           </a:p>
@@ -6399,7 +6462,7 @@
           <a:p>
             <a:fld id="{9B9F853A-9183-4EE6-852D-47D503602EAA}" type="datetimeFigureOut">
               <a:rPr lang="en-AU" smtClean="0"/>
-              <a:t>28/11/2019</a:t>
+              <a:t>1/12/2019</a:t>
             </a:fld>
             <a:endParaRPr lang="en-AU"/>
           </a:p>
@@ -6541,7 +6604,7 @@
           <a:p>
             <a:fld id="{9B9F853A-9183-4EE6-852D-47D503602EAA}" type="datetimeFigureOut">
               <a:rPr lang="en-AU" smtClean="0"/>
-              <a:t>28/11/2019</a:t>
+              <a:t>1/12/2019</a:t>
             </a:fld>
             <a:endParaRPr lang="en-AU"/>
           </a:p>
@@ -6654,7 +6717,7 @@
           <a:p>
             <a:fld id="{9B9F853A-9183-4EE6-852D-47D503602EAA}" type="datetimeFigureOut">
               <a:rPr lang="en-AU" smtClean="0"/>
-              <a:t>28/11/2019</a:t>
+              <a:t>1/12/2019</a:t>
             </a:fld>
             <a:endParaRPr lang="en-AU"/>
           </a:p>
@@ -6967,7 +7030,7 @@
           <a:p>
             <a:fld id="{9B9F853A-9183-4EE6-852D-47D503602EAA}" type="datetimeFigureOut">
               <a:rPr lang="en-AU" smtClean="0"/>
-              <a:t>28/11/2019</a:t>
+              <a:t>1/12/2019</a:t>
             </a:fld>
             <a:endParaRPr lang="en-AU"/>
           </a:p>
@@ -7256,7 +7319,7 @@
           <a:p>
             <a:fld id="{9B9F853A-9183-4EE6-852D-47D503602EAA}" type="datetimeFigureOut">
               <a:rPr lang="en-AU" smtClean="0"/>
-              <a:t>28/11/2019</a:t>
+              <a:t>1/12/2019</a:t>
             </a:fld>
             <a:endParaRPr lang="en-AU"/>
           </a:p>
@@ -7499,7 +7562,7 @@
           <a:p>
             <a:fld id="{9B9F853A-9183-4EE6-852D-47D503602EAA}" type="datetimeFigureOut">
               <a:rPr lang="en-AU" smtClean="0"/>
-              <a:t>28/11/2019</a:t>
+              <a:t>1/12/2019</a:t>
             </a:fld>
             <a:endParaRPr lang="en-AU"/>
           </a:p>
@@ -7929,7 +7992,7 @@
           <p:nvPr>
             <p:extLst>
               <p:ext uri="{D42A27DB-BD31-4B8C-83A1-F6EECF244321}">
-                <p14:modId xmlns:p14="http://schemas.microsoft.com/office/powerpoint/2010/main" val="3982062641"/>
+                <p14:modId xmlns:p14="http://schemas.microsoft.com/office/powerpoint/2010/main" val="541793196"/>
               </p:ext>
             </p:extLst>
           </p:nvPr>

</xml_diff>